<commit_message>
Fix Chapter 3 Lecture 6
</commit_message>
<xml_diff>
--- a/content/3-cc310/03-program-contract-performance/06-time-complexity-slides.pptx
+++ b/content/3-cc310/03-program-contract-performance/06-time-complexity-slides.pptx
@@ -9172,7 +9172,7 @@
           <a:p>
             <a:fld id="{272389C0-F8B9-420B-9797-34EC28597D7C}" type="datetimeFigureOut">
               <a:rPr lang="en-US" smtClean="0"/>
-              <a:t>1/31/2020</a:t>
+              <a:t>2/5/2020</a:t>
             </a:fld>
             <a:endParaRPr lang="en-US" dirty="0"/>
           </a:p>
@@ -9686,7 +9686,7 @@
           <a:p>
             <a:r>
               <a:rPr lang="en-US" dirty="0"/>
-              <a:t>And, like the linear algorithm, we have our two possible assignments, which are highlighted in green. Again, neither may be executed and at most 1 of them will be executed each time through the loop.</a:t>
+              <a:t>And, like the linear algorithm, we have our two possible assignments, which are highlighted in green. </a:t>
             </a:r>
           </a:p>
           <a:p>
@@ -11553,7 +11553,7 @@
           <a:p>
             <a:fld id="{15DE2593-7DD3-4CBA-B2EC-AD7F03D69370}" type="datetimeFigureOut">
               <a:rPr lang="en-US" smtClean="0"/>
-              <a:t>1/31/2020</a:t>
+              <a:t>2/5/2020</a:t>
             </a:fld>
             <a:endParaRPr lang="en-US" dirty="0"/>
           </a:p>
@@ -11751,7 +11751,7 @@
           <a:p>
             <a:fld id="{15DE2593-7DD3-4CBA-B2EC-AD7F03D69370}" type="datetimeFigureOut">
               <a:rPr lang="en-US" smtClean="0"/>
-              <a:t>1/31/2020</a:t>
+              <a:t>2/5/2020</a:t>
             </a:fld>
             <a:endParaRPr lang="en-US" dirty="0"/>
           </a:p>
@@ -11959,7 +11959,7 @@
           <a:p>
             <a:fld id="{15DE2593-7DD3-4CBA-B2EC-AD7F03D69370}" type="datetimeFigureOut">
               <a:rPr lang="en-US" smtClean="0"/>
-              <a:t>1/31/2020</a:t>
+              <a:t>2/5/2020</a:t>
             </a:fld>
             <a:endParaRPr lang="en-US" dirty="0"/>
           </a:p>
@@ -12157,7 +12157,7 @@
           <a:p>
             <a:fld id="{15DE2593-7DD3-4CBA-B2EC-AD7F03D69370}" type="datetimeFigureOut">
               <a:rPr lang="en-US" smtClean="0"/>
-              <a:t>1/31/2020</a:t>
+              <a:t>2/5/2020</a:t>
             </a:fld>
             <a:endParaRPr lang="en-US" dirty="0"/>
           </a:p>
@@ -12432,7 +12432,7 @@
           <a:p>
             <a:fld id="{15DE2593-7DD3-4CBA-B2EC-AD7F03D69370}" type="datetimeFigureOut">
               <a:rPr lang="en-US" smtClean="0"/>
-              <a:t>1/31/2020</a:t>
+              <a:t>2/5/2020</a:t>
             </a:fld>
             <a:endParaRPr lang="en-US" dirty="0"/>
           </a:p>
@@ -12697,7 +12697,7 @@
           <a:p>
             <a:fld id="{15DE2593-7DD3-4CBA-B2EC-AD7F03D69370}" type="datetimeFigureOut">
               <a:rPr lang="en-US" smtClean="0"/>
-              <a:t>1/31/2020</a:t>
+              <a:t>2/5/2020</a:t>
             </a:fld>
             <a:endParaRPr lang="en-US" dirty="0"/>
           </a:p>
@@ -13109,7 +13109,7 @@
           <a:p>
             <a:fld id="{15DE2593-7DD3-4CBA-B2EC-AD7F03D69370}" type="datetimeFigureOut">
               <a:rPr lang="en-US" smtClean="0"/>
-              <a:t>1/31/2020</a:t>
+              <a:t>2/5/2020</a:t>
             </a:fld>
             <a:endParaRPr lang="en-US" dirty="0"/>
           </a:p>
@@ -13250,7 +13250,7 @@
           <a:p>
             <a:fld id="{15DE2593-7DD3-4CBA-B2EC-AD7F03D69370}" type="datetimeFigureOut">
               <a:rPr lang="en-US" smtClean="0"/>
-              <a:t>1/31/2020</a:t>
+              <a:t>2/5/2020</a:t>
             </a:fld>
             <a:endParaRPr lang="en-US" dirty="0"/>
           </a:p>
@@ -13363,7 +13363,7 @@
           <a:p>
             <a:fld id="{15DE2593-7DD3-4CBA-B2EC-AD7F03D69370}" type="datetimeFigureOut">
               <a:rPr lang="en-US" smtClean="0"/>
-              <a:t>1/31/2020</a:t>
+              <a:t>2/5/2020</a:t>
             </a:fld>
             <a:endParaRPr lang="en-US" dirty="0"/>
           </a:p>
@@ -13674,7 +13674,7 @@
           <a:p>
             <a:fld id="{15DE2593-7DD3-4CBA-B2EC-AD7F03D69370}" type="datetimeFigureOut">
               <a:rPr lang="en-US" smtClean="0"/>
-              <a:t>1/31/2020</a:t>
+              <a:t>2/5/2020</a:t>
             </a:fld>
             <a:endParaRPr lang="en-US" dirty="0"/>
           </a:p>
@@ -13962,7 +13962,7 @@
           <a:p>
             <a:fld id="{15DE2593-7DD3-4CBA-B2EC-AD7F03D69370}" type="datetimeFigureOut">
               <a:rPr lang="en-US" smtClean="0"/>
-              <a:t>1/31/2020</a:t>
+              <a:t>2/5/2020</a:t>
             </a:fld>
             <a:endParaRPr lang="en-US" dirty="0"/>
           </a:p>
@@ -14206,7 +14206,7 @@
           <a:p>
             <a:fld id="{15DE2593-7DD3-4CBA-B2EC-AD7F03D69370}" type="datetimeFigureOut">
               <a:rPr lang="en-US" smtClean="0"/>
-              <a:t>1/31/2020</a:t>
+              <a:t>2/5/2020</a:t>
             </a:fld>
             <a:endParaRPr lang="en-US" dirty="0"/>
           </a:p>
@@ -17277,7 +17277,7 @@
             </a:pPr>
             <a:r>
               <a:rPr lang="en-US" sz="2800" dirty="0"/>
-              <a:t>Max of 3 each time through</a:t>
+              <a:t>Max of 4 each time through</a:t>
             </a:r>
           </a:p>
           <a:p>
@@ -17287,11 +17287,11 @@
             </a:pPr>
             <a:r>
               <a:rPr lang="en-US" sz="2800" dirty="0"/>
-              <a:t>Max = 3</a:t>
+              <a:t>Max = 4</a:t>
             </a:r>
             <a:r>
               <a:rPr lang="en-US" sz="2800" i="1" dirty="0"/>
-              <a:t>N/2 = 1.5N</a:t>
+              <a:t>N/2 = 2N</a:t>
             </a:r>
             <a:endParaRPr lang="en-US" sz="2800" dirty="0"/>
           </a:p>
@@ -17318,7 +17318,6 @@
               <a:rPr lang="en-US" sz="2800" i="1" dirty="0"/>
               <a:t>2N/2 = N</a:t>
             </a:r>
-            <a:endParaRPr lang="en-US" sz="2800" dirty="0"/>
           </a:p>
         </p:txBody>
       </p:sp>
@@ -37728,12 +37727,6 @@
 </file>
 
 <file path=customXml/item1.xml><?xml version="1.0" encoding="utf-8"?>
-<p:properties xmlns:p="http://schemas.microsoft.com/office/2006/metadata/properties" xmlns:xsi="http://www.w3.org/2001/XMLSchema-instance" xmlns:pc="http://schemas.microsoft.com/office/infopath/2007/PartnerControls">
-  <documentManagement/>
-</p:properties>
-</file>
-
-<file path=customXml/item2.xml><?xml version="1.0" encoding="utf-8"?>
 <ct:contentTypeSchema xmlns:ct="http://schemas.microsoft.com/office/2006/metadata/contentType" xmlns:ma="http://schemas.microsoft.com/office/2006/metadata/properties/metaAttributes" ct:_="" ma:_="" ma:contentTypeName="Document" ma:contentTypeID="0x01010083F0F5F090D6FE4C9D66FF879A7CC7B3" ma:contentTypeVersion="9" ma:contentTypeDescription="Create a new document." ma:contentTypeScope="" ma:versionID="606f2283565418712a5a3267706a5f5d">
   <xsd:schema xmlns:xsd="http://www.w3.org/2001/XMLSchema" xmlns:xs="http://www.w3.org/2001/XMLSchema" xmlns:p="http://schemas.microsoft.com/office/2006/metadata/properties" xmlns:ns2="58c44ba5-51a4-40bc-b9f0-9fe2032e2130" targetNamespace="http://schemas.microsoft.com/office/2006/metadata/properties" ma:root="true" ma:fieldsID="0d021ce73d87f7988edb471f4256858c" ns2:_="">
     <xsd:import namespace="58c44ba5-51a4-40bc-b9f0-9fe2032e2130"/>
@@ -37911,6 +37904,12 @@
 </ct:contentTypeSchema>
 </file>
 
+<file path=customXml/item2.xml><?xml version="1.0" encoding="utf-8"?>
+<p:properties xmlns:p="http://schemas.microsoft.com/office/2006/metadata/properties" xmlns:xsi="http://www.w3.org/2001/XMLSchema-instance" xmlns:pc="http://schemas.microsoft.com/office/infopath/2007/PartnerControls">
+  <documentManagement/>
+</p:properties>
+</file>
+
 <file path=customXml/item3.xml><?xml version="1.0" encoding="utf-8"?>
 <?mso-contentType ?>
 <FormTemplates xmlns="http://schemas.microsoft.com/sharepoint/v3/contenttype/forms">
@@ -37921,15 +37920,6 @@
 </file>
 
 <file path=customXml/itemProps1.xml><?xml version="1.0" encoding="utf-8"?>
-<ds:datastoreItem xmlns:ds="http://schemas.openxmlformats.org/officeDocument/2006/customXml" ds:itemID="{1091C435-747D-4FFA-9672-3C4E123F79F3}">
-  <ds:schemaRefs>
-    <ds:schemaRef ds:uri="http://schemas.microsoft.com/office/2006/metadata/properties"/>
-    <ds:schemaRef ds:uri="http://schemas.microsoft.com/office/infopath/2007/PartnerControls"/>
-  </ds:schemaRefs>
-</ds:datastoreItem>
-</file>
-
-<file path=customXml/itemProps2.xml><?xml version="1.0" encoding="utf-8"?>
 <ds:datastoreItem xmlns:ds="http://schemas.openxmlformats.org/officeDocument/2006/customXml" ds:itemID="{29605D0F-DB16-41D7-85BA-80FD23F9D4BC}">
   <ds:schemaRefs>
     <ds:schemaRef ds:uri="http://schemas.microsoft.com/office/2006/metadata/contentType"/>
@@ -37947,6 +37937,15 @@
 </ds:datastoreItem>
 </file>
 
+<file path=customXml/itemProps2.xml><?xml version="1.0" encoding="utf-8"?>
+<ds:datastoreItem xmlns:ds="http://schemas.openxmlformats.org/officeDocument/2006/customXml" ds:itemID="{1091C435-747D-4FFA-9672-3C4E123F79F3}">
+  <ds:schemaRefs>
+    <ds:schemaRef ds:uri="http://schemas.microsoft.com/office/2006/metadata/properties"/>
+    <ds:schemaRef ds:uri="http://schemas.microsoft.com/office/infopath/2007/PartnerControls"/>
+  </ds:schemaRefs>
+</ds:datastoreItem>
+</file>
+
 <file path=customXml/itemProps3.xml><?xml version="1.0" encoding="utf-8"?>
 <ds:datastoreItem xmlns:ds="http://schemas.openxmlformats.org/officeDocument/2006/customXml" ds:itemID="{C7AE92EF-36AB-4FBF-8B40-C1E0054F61CB}">
   <ds:schemaRefs>

</xml_diff>